<commit_message>
Minor change to the preso for IETF-113
</commit_message>
<xml_diff>
--- a/IETF-presos/IETF-113 - draft-kampanakis-tls-scas-latest-00.pptx
+++ b/IETF-presos/IETF-113 - draft-kampanakis-tls-scas-latest-00.pptx
@@ -4153,7 +4153,7 @@
         <p:spPr/>
         <p:txBody>
           <a:bodyPr>
-            <a:normAutofit lnSpcReduction="10000"/>
+            <a:normAutofit/>
           </a:bodyPr>
           <a:lstStyle/>
           <a:p>
@@ -4178,41 +4178,11 @@
             <a:pPr lvl="1"/>
             <a:r>
               <a:rPr lang="en-US"/>
-              <a:t>But also </a:t>
+              <a:t>But also, </a:t>
             </a:r>
             <a:r>
               <a:rPr lang="en-US" dirty="0"/>
-              <a:t>let’s not forget</a:t>
-            </a:r>
-          </a:p>
-          <a:p>
-            <a:pPr lvl="2"/>
-            <a:r>
-              <a:rPr lang="en-US" dirty="0"/>
-              <a:t>TLS is not just for the Web.</a:t>
-            </a:r>
-          </a:p>
-          <a:p>
-            <a:pPr lvl="2"/>
-            <a:r>
-              <a:rPr lang="en-US" dirty="0"/>
-              <a:t>A compression certificate dictionary is used in draft-</a:t>
-            </a:r>
-            <a:r>
-              <a:rPr lang="en-US" dirty="0" err="1"/>
-              <a:t>ietf</a:t>
-            </a:r>
-            <a:r>
-              <a:rPr lang="en-US" dirty="0"/>
-              <a:t>-</a:t>
-            </a:r>
-            <a:r>
-              <a:rPr lang="en-US" dirty="0" err="1"/>
-              <a:t>tls-ctls</a:t>
-            </a:r>
-            <a:r>
-              <a:rPr lang="en-US" dirty="0"/>
-              <a:t> as well.</a:t>
+              <a:t>let’s not forget, TLS is not just for the Web.</a:t>
             </a:r>
           </a:p>
           <a:p>
@@ -12883,6 +12853,41 @@
               <a:rPr lang="en-US" dirty="0"/>
               <a:t>Browsers build and distribute revocation lists already</a:t>
             </a:r>
+          </a:p>
+          <a:p>
+            <a:pPr lvl="1"/>
+            <a:r>
+              <a:rPr lang="en-US" dirty="0"/>
+              <a:t>draft-</a:t>
+            </a:r>
+            <a:r>
+              <a:rPr lang="en-US" dirty="0" err="1"/>
+              <a:t>ietf</a:t>
+            </a:r>
+            <a:r>
+              <a:rPr lang="en-US" dirty="0"/>
+              <a:t>-</a:t>
+            </a:r>
+            <a:r>
+              <a:rPr lang="en-US" dirty="0" err="1"/>
+              <a:t>tls-ctls</a:t>
+            </a:r>
+            <a:r>
+              <a:rPr lang="en-US" dirty="0"/>
+              <a:t> also uses a compression certificate </a:t>
+            </a:r>
+            <a:r>
+              <a:rPr lang="en-US" dirty="0" err="1"/>
+              <a:t>dictionar</a:t>
+            </a:r>
+            <a:r>
+              <a:rPr lang="en-US" dirty="0"/>
+              <a:t>. </a:t>
+            </a:r>
+          </a:p>
+          <a:p>
+            <a:pPr lvl="1"/>
+            <a:endParaRPr lang="en-US" dirty="0"/>
           </a:p>
         </p:txBody>
       </p:sp>

</xml_diff>